<commit_message>
Internal Sensor / Main Screen
Updated code for internal sensor and changes made to Main Screen.
</commit_message>
<xml_diff>
--- a/AppDevelopment.pptx
+++ b/AppDevelopment.pptx
@@ -8,8 +8,8 @@
     <p:sldId id="256" r:id="rId2"/>
     <p:sldId id="257" r:id="rId3"/>
     <p:sldId id="260" r:id="rId4"/>
-    <p:sldId id="259" r:id="rId5"/>
-    <p:sldId id="258" r:id="rId6"/>
+    <p:sldId id="261" r:id="rId5"/>
+    <p:sldId id="262" r:id="rId6"/>
   </p:sldIdLst>
   <p:sldSz cx="9144000" cy="6858000" type="screen4x3"/>
   <p:notesSz cx="6858000" cy="9144000"/>
@@ -293,7 +293,7 @@
             <a:fld id="{5509802D-546D-4A43-A558-4F6655088C4A}" type="datetimeFigureOut">
               <a:rPr lang="en-US" smtClean="0"/>
               <a:pPr/>
-              <a:t>11/11/2017</a:t>
+              <a:t>8/11/2018</a:t>
             </a:fld>
             <a:endParaRPr lang="en-US"/>
           </a:p>
@@ -460,7 +460,7 @@
             <a:fld id="{5509802D-546D-4A43-A558-4F6655088C4A}" type="datetimeFigureOut">
               <a:rPr lang="en-US" smtClean="0"/>
               <a:pPr/>
-              <a:t>11/11/2017</a:t>
+              <a:t>8/11/2018</a:t>
             </a:fld>
             <a:endParaRPr lang="en-US"/>
           </a:p>
@@ -637,7 +637,7 @@
             <a:fld id="{5509802D-546D-4A43-A558-4F6655088C4A}" type="datetimeFigureOut">
               <a:rPr lang="en-US" smtClean="0"/>
               <a:pPr/>
-              <a:t>11/11/2017</a:t>
+              <a:t>8/11/2018</a:t>
             </a:fld>
             <a:endParaRPr lang="en-US"/>
           </a:p>
@@ -804,7 +804,7 @@
             <a:fld id="{5509802D-546D-4A43-A558-4F6655088C4A}" type="datetimeFigureOut">
               <a:rPr lang="en-US" smtClean="0"/>
               <a:pPr/>
-              <a:t>11/11/2017</a:t>
+              <a:t>8/11/2018</a:t>
             </a:fld>
             <a:endParaRPr lang="en-US"/>
           </a:p>
@@ -1047,7 +1047,7 @@
             <a:fld id="{5509802D-546D-4A43-A558-4F6655088C4A}" type="datetimeFigureOut">
               <a:rPr lang="en-US" smtClean="0"/>
               <a:pPr/>
-              <a:t>11/11/2017</a:t>
+              <a:t>8/11/2018</a:t>
             </a:fld>
             <a:endParaRPr lang="en-US"/>
           </a:p>
@@ -1332,7 +1332,7 @@
             <a:fld id="{5509802D-546D-4A43-A558-4F6655088C4A}" type="datetimeFigureOut">
               <a:rPr lang="en-US" smtClean="0"/>
               <a:pPr/>
-              <a:t>11/11/2017</a:t>
+              <a:t>8/11/2018</a:t>
             </a:fld>
             <a:endParaRPr lang="en-US"/>
           </a:p>
@@ -1751,7 +1751,7 @@
             <a:fld id="{5509802D-546D-4A43-A558-4F6655088C4A}" type="datetimeFigureOut">
               <a:rPr lang="en-US" smtClean="0"/>
               <a:pPr/>
-              <a:t>11/11/2017</a:t>
+              <a:t>8/11/2018</a:t>
             </a:fld>
             <a:endParaRPr lang="en-US"/>
           </a:p>
@@ -1866,7 +1866,7 @@
             <a:fld id="{5509802D-546D-4A43-A558-4F6655088C4A}" type="datetimeFigureOut">
               <a:rPr lang="en-US" smtClean="0"/>
               <a:pPr/>
-              <a:t>11/11/2017</a:t>
+              <a:t>8/11/2018</a:t>
             </a:fld>
             <a:endParaRPr lang="en-US"/>
           </a:p>
@@ -1958,7 +1958,7 @@
             <a:fld id="{5509802D-546D-4A43-A558-4F6655088C4A}" type="datetimeFigureOut">
               <a:rPr lang="en-US" smtClean="0"/>
               <a:pPr/>
-              <a:t>11/11/2017</a:t>
+              <a:t>8/11/2018</a:t>
             </a:fld>
             <a:endParaRPr lang="en-US"/>
           </a:p>
@@ -2232,7 +2232,7 @@
             <a:fld id="{5509802D-546D-4A43-A558-4F6655088C4A}" type="datetimeFigureOut">
               <a:rPr lang="en-US" smtClean="0"/>
               <a:pPr/>
-              <a:t>11/11/2017</a:t>
+              <a:t>8/11/2018</a:t>
             </a:fld>
             <a:endParaRPr lang="en-US"/>
           </a:p>
@@ -2482,7 +2482,7 @@
             <a:fld id="{5509802D-546D-4A43-A558-4F6655088C4A}" type="datetimeFigureOut">
               <a:rPr lang="en-US" smtClean="0"/>
               <a:pPr/>
-              <a:t>11/11/2017</a:t>
+              <a:t>8/11/2018</a:t>
             </a:fld>
             <a:endParaRPr lang="en-US"/>
           </a:p>
@@ -2692,7 +2692,7 @@
             <a:fld id="{5509802D-546D-4A43-A558-4F6655088C4A}" type="datetimeFigureOut">
               <a:rPr lang="en-US" smtClean="0"/>
               <a:pPr/>
-              <a:t>11/11/2017</a:t>
+              <a:t>8/11/2018</a:t>
             </a:fld>
             <a:endParaRPr lang="en-US"/>
           </a:p>
@@ -3516,7 +3516,6 @@
               <a:rPr lang="en-US" sz="2800" dirty="0" smtClean="0"/>
               <a:t>Discover Services</a:t>
             </a:r>
-            <a:endParaRPr lang="en-US" sz="2800" dirty="0" smtClean="0"/>
           </a:p>
           <a:p>
             <a:pPr lvl="1"/>
@@ -3641,20 +3640,14 @@
             <p:ph type="title"/>
           </p:nvPr>
         </p:nvSpPr>
-        <p:spPr>
-          <a:xfrm>
-            <a:off x="457200" y="274638"/>
-            <a:ext cx="4800600" cy="1143000"/>
-          </a:xfrm>
-        </p:spPr>
-        <p:txBody>
-          <a:bodyPr/>
-          <a:lstStyle/>
-          <a:p>
-            <a:pPr algn="l"/>
+        <p:spPr/>
+        <p:txBody>
+          <a:bodyPr/>
+          <a:lstStyle/>
+          <a:p>
             <a:r>
               <a:rPr lang="en-US" dirty="0" smtClean="0"/>
-              <a:t>Settings</a:t>
+              <a:t>Saving Data</a:t>
             </a:r>
             <a:endParaRPr lang="en-US" dirty="0"/>
           </a:p>
@@ -3670,56 +3663,387 @@
             <p:ph idx="1"/>
           </p:nvPr>
         </p:nvSpPr>
-        <p:spPr>
-          <a:xfrm>
-            <a:off x="457200" y="1600200"/>
-            <a:ext cx="4800600" cy="4525963"/>
-          </a:xfrm>
-        </p:spPr>
-        <p:txBody>
-          <a:bodyPr/>
-          <a:lstStyle/>
-          <a:p>
-            <a:r>
-              <a:rPr lang="en-US" dirty="0" smtClean="0"/>
-              <a:t> ?</a:t>
-            </a:r>
-            <a:endParaRPr lang="en-US" dirty="0"/>
-          </a:p>
-        </p:txBody>
-      </p:sp>
-      <p:pic>
-        <p:nvPicPr>
-          <p:cNvPr id="3074" name="Picture 2"/>
-          <p:cNvPicPr>
-            <a:picLocks noChangeAspect="1" noChangeArrowheads="1"/>
-          </p:cNvPicPr>
-          <p:nvPr/>
-        </p:nvPicPr>
-        <p:blipFill>
-          <a:blip r:embed="rId2" cstate="print"/>
-          <a:srcRect/>
-          <a:stretch>
-            <a:fillRect/>
-          </a:stretch>
-        </p:blipFill>
-        <p:spPr bwMode="auto">
-          <a:xfrm>
-            <a:off x="5562600" y="0"/>
-            <a:ext cx="3581400" cy="6883400"/>
-          </a:xfrm>
-          <a:prstGeom prst="rect">
-            <a:avLst/>
-          </a:prstGeom>
-          <a:noFill/>
-          <a:ln w="9525">
-            <a:noFill/>
-            <a:miter lim="800000"/>
-            <a:headEnd/>
-            <a:tailEnd/>
-          </a:ln>
-        </p:spPr>
-      </p:pic>
+        <p:spPr/>
+        <p:txBody>
+          <a:bodyPr>
+            <a:normAutofit/>
+          </a:bodyPr>
+          <a:lstStyle/>
+          <a:p>
+            <a:r>
+              <a:rPr lang="en-US" sz="1600" dirty="0" err="1" smtClean="0"/>
+              <a:t>android.hardware.SensorManager</a:t>
+            </a:r>
+            <a:r>
+              <a:rPr lang="en-US" sz="1600" dirty="0" smtClean="0"/>
+              <a:t> manager</a:t>
+            </a:r>
+          </a:p>
+          <a:p>
+            <a:r>
+              <a:rPr lang="en-US" sz="1600" dirty="0" smtClean="0"/>
+              <a:t>Start:</a:t>
+            </a:r>
+          </a:p>
+          <a:p>
+            <a:pPr lvl="1"/>
+            <a:r>
+              <a:rPr lang="en-US" sz="1200" b="1" dirty="0" err="1" smtClean="0"/>
+              <a:t>manager</a:t>
+            </a:r>
+            <a:r>
+              <a:rPr lang="en-US" sz="1200" dirty="0" err="1" smtClean="0"/>
+              <a:t>.registerListener</a:t>
+            </a:r>
+            <a:r>
+              <a:rPr lang="en-US" sz="1200" dirty="0" smtClean="0"/>
+              <a:t>(</a:t>
+            </a:r>
+            <a:r>
+              <a:rPr lang="en-US" sz="1200" dirty="0" err="1" smtClean="0"/>
+              <a:t>MainActivity.</a:t>
+            </a:r>
+            <a:r>
+              <a:rPr lang="en-US" sz="1200" b="1" dirty="0" err="1" smtClean="0"/>
+              <a:t>this</a:t>
+            </a:r>
+            <a:r>
+              <a:rPr lang="en-US" sz="1200" dirty="0" smtClean="0"/>
+              <a:t>, </a:t>
+            </a:r>
+            <a:r>
+              <a:rPr lang="en-US" sz="1200" b="1" dirty="0" err="1" smtClean="0"/>
+              <a:t>manager</a:t>
+            </a:r>
+            <a:r>
+              <a:rPr lang="en-US" sz="1200" dirty="0" err="1" smtClean="0"/>
+              <a:t>.getDefaultSensor</a:t>
+            </a:r>
+            <a:r>
+              <a:rPr lang="en-US" sz="1200" dirty="0" smtClean="0"/>
+              <a:t>(</a:t>
+            </a:r>
+            <a:r>
+              <a:rPr lang="en-US" sz="1200" dirty="0" err="1" smtClean="0"/>
+              <a:t>Sensor.</a:t>
+            </a:r>
+            <a:r>
+              <a:rPr lang="en-US" sz="1200" b="1" i="1" dirty="0" err="1" smtClean="0"/>
+              <a:t>TYPE_ACCELEROMETER</a:t>
+            </a:r>
+            <a:r>
+              <a:rPr lang="en-US" sz="1200" dirty="0" smtClean="0"/>
+              <a:t>), 0);</a:t>
+            </a:r>
+          </a:p>
+          <a:p>
+            <a:pPr lvl="1"/>
+            <a:r>
+              <a:rPr lang="en-US" sz="1200" b="1" dirty="0" smtClean="0"/>
+              <a:t>manager </a:t>
+            </a:r>
+            <a:r>
+              <a:rPr lang="en-US" sz="1200" dirty="0" smtClean="0"/>
+              <a:t>= (</a:t>
+            </a:r>
+            <a:r>
+              <a:rPr lang="en-US" sz="1200" dirty="0" err="1" smtClean="0"/>
+              <a:t>SensorManager</a:t>
+            </a:r>
+            <a:r>
+              <a:rPr lang="en-US" sz="1200" dirty="0" smtClean="0"/>
+              <a:t>) </a:t>
+            </a:r>
+            <a:r>
+              <a:rPr lang="en-US" sz="1200" dirty="0" err="1" smtClean="0"/>
+              <a:t>getSystemService</a:t>
+            </a:r>
+            <a:r>
+              <a:rPr lang="en-US" sz="1200" dirty="0" smtClean="0"/>
+              <a:t>(</a:t>
+            </a:r>
+            <a:r>
+              <a:rPr lang="en-US" sz="1200" dirty="0" err="1" smtClean="0"/>
+              <a:t>Context.</a:t>
+            </a:r>
+            <a:r>
+              <a:rPr lang="en-US" sz="1200" b="1" i="1" dirty="0" err="1" smtClean="0"/>
+              <a:t>SENSOR_SERVICE</a:t>
+            </a:r>
+            <a:r>
+              <a:rPr lang="en-US" sz="1200" dirty="0" smtClean="0"/>
+              <a:t>);</a:t>
+            </a:r>
+          </a:p>
+          <a:p>
+            <a:pPr lvl="1"/>
+            <a:endParaRPr lang="en-US" sz="1200" dirty="0" smtClean="0"/>
+          </a:p>
+          <a:p>
+            <a:r>
+              <a:rPr lang="en-US" sz="1600" dirty="0" smtClean="0"/>
+              <a:t>Stop:</a:t>
+            </a:r>
+          </a:p>
+          <a:p>
+            <a:pPr lvl="1"/>
+            <a:r>
+              <a:rPr lang="en-US" sz="1200" b="1" dirty="0" err="1" smtClean="0"/>
+              <a:t>manager</a:t>
+            </a:r>
+            <a:r>
+              <a:rPr lang="en-US" sz="1200" dirty="0" err="1" smtClean="0"/>
+              <a:t>.unregisterListener</a:t>
+            </a:r>
+            <a:r>
+              <a:rPr lang="en-US" sz="1200" dirty="0" smtClean="0"/>
+              <a:t>(</a:t>
+            </a:r>
+            <a:r>
+              <a:rPr lang="en-US" sz="1200" dirty="0" err="1" smtClean="0"/>
+              <a:t>MainActivity.</a:t>
+            </a:r>
+            <a:r>
+              <a:rPr lang="en-US" sz="1200" b="1" dirty="0" err="1" smtClean="0"/>
+              <a:t>this</a:t>
+            </a:r>
+            <a:r>
+              <a:rPr lang="en-US" sz="1200" dirty="0" smtClean="0"/>
+              <a:t>);</a:t>
+            </a:r>
+          </a:p>
+          <a:p>
+            <a:endParaRPr lang="en-US" sz="1600" dirty="0" smtClean="0"/>
+          </a:p>
+          <a:p>
+            <a:r>
+              <a:rPr lang="en-US" sz="1600" b="1" dirty="0" smtClean="0"/>
+              <a:t>Storage Directory:</a:t>
+            </a:r>
+          </a:p>
+          <a:p>
+            <a:pPr lvl="1"/>
+            <a:r>
+              <a:rPr lang="en-US" sz="1200" b="1" dirty="0" err="1" smtClean="0"/>
+              <a:t>this</a:t>
+            </a:r>
+            <a:r>
+              <a:rPr lang="en-US" sz="1200" dirty="0" err="1" smtClean="0"/>
+              <a:t>.getExternalFilesDir</a:t>
+            </a:r>
+            <a:r>
+              <a:rPr lang="en-US" sz="1200" dirty="0" smtClean="0"/>
+              <a:t>(</a:t>
+            </a:r>
+            <a:r>
+              <a:rPr lang="en-US" sz="1200" b="1" dirty="0" smtClean="0"/>
+              <a:t>null</a:t>
+            </a:r>
+            <a:r>
+              <a:rPr lang="en-US" sz="1200" dirty="0" smtClean="0"/>
+              <a:t>).</a:t>
+            </a:r>
+            <a:r>
+              <a:rPr lang="en-US" sz="1200" dirty="0" err="1" smtClean="0"/>
+              <a:t>getAbsolutePath</a:t>
+            </a:r>
+            <a:r>
+              <a:rPr lang="en-US" sz="1200" dirty="0" smtClean="0"/>
+              <a:t>();</a:t>
+            </a:r>
+          </a:p>
+          <a:p>
+            <a:pPr lvl="1"/>
+            <a:endParaRPr lang="en-US" sz="1200" dirty="0" smtClean="0"/>
+          </a:p>
+          <a:p>
+            <a:r>
+              <a:rPr lang="en-US" sz="1600" dirty="0" err="1" smtClean="0"/>
+              <a:t>Java.io.FileWriter</a:t>
+            </a:r>
+            <a:endParaRPr lang="en-US" sz="1600" dirty="0" smtClean="0"/>
+          </a:p>
+          <a:p>
+            <a:pPr lvl="1"/>
+            <a:r>
+              <a:rPr lang="en-US" sz="1200" dirty="0" err="1" smtClean="0"/>
+              <a:t>FileWriter</a:t>
+            </a:r>
+            <a:r>
+              <a:rPr lang="en-US" sz="1200" dirty="0" smtClean="0"/>
+              <a:t> </a:t>
+            </a:r>
+            <a:r>
+              <a:rPr lang="en-US" sz="1200" b="1" dirty="0" smtClean="0"/>
+              <a:t>writer</a:t>
+            </a:r>
+            <a:r>
+              <a:rPr lang="en-US" sz="1200" dirty="0" smtClean="0"/>
+              <a:t>;</a:t>
+            </a:r>
+          </a:p>
+          <a:p>
+            <a:pPr lvl="1"/>
+            <a:r>
+              <a:rPr lang="en-US" sz="1200" b="1" dirty="0" smtClean="0"/>
+              <a:t>writer </a:t>
+            </a:r>
+            <a:r>
+              <a:rPr lang="en-US" sz="1200" dirty="0" smtClean="0"/>
+              <a:t>= </a:t>
+            </a:r>
+            <a:r>
+              <a:rPr lang="en-US" sz="1200" b="1" dirty="0" smtClean="0"/>
+              <a:t>new </a:t>
+            </a:r>
+            <a:r>
+              <a:rPr lang="en-US" sz="1200" dirty="0" err="1" smtClean="0"/>
+              <a:t>FileWriter</a:t>
+            </a:r>
+            <a:r>
+              <a:rPr lang="en-US" sz="1200" dirty="0" smtClean="0"/>
+              <a:t>(</a:t>
+            </a:r>
+            <a:r>
+              <a:rPr lang="en-US" sz="1200" b="1" dirty="0" smtClean="0"/>
+              <a:t>new </a:t>
+            </a:r>
+            <a:r>
+              <a:rPr lang="en-US" sz="1200" dirty="0" smtClean="0"/>
+              <a:t>File(</a:t>
+            </a:r>
+            <a:r>
+              <a:rPr lang="en-US" sz="1200" dirty="0" err="1" smtClean="0"/>
+              <a:t>getStorageDir</a:t>
+            </a:r>
+            <a:r>
+              <a:rPr lang="en-US" sz="1200" dirty="0" smtClean="0"/>
+              <a:t>(), </a:t>
+            </a:r>
+            <a:r>
+              <a:rPr lang="en-US" sz="1200" b="1" dirty="0" smtClean="0"/>
+              <a:t>"sensors_" </a:t>
+            </a:r>
+            <a:r>
+              <a:rPr lang="en-US" sz="1200" dirty="0" smtClean="0"/>
+              <a:t>+ </a:t>
+            </a:r>
+            <a:r>
+              <a:rPr lang="en-US" sz="1200" dirty="0" err="1" smtClean="0"/>
+              <a:t>System.</a:t>
+            </a:r>
+            <a:r>
+              <a:rPr lang="en-US" sz="1200" i="1" dirty="0" err="1" smtClean="0"/>
+              <a:t>currentTimeMillis</a:t>
+            </a:r>
+            <a:r>
+              <a:rPr lang="en-US" sz="1200" dirty="0" smtClean="0"/>
+              <a:t>() + </a:t>
+            </a:r>
+            <a:r>
+              <a:rPr lang="en-US" sz="1200" b="1" dirty="0" smtClean="0"/>
+              <a:t>".</a:t>
+            </a:r>
+            <a:r>
+              <a:rPr lang="en-US" sz="1200" b="1" dirty="0" err="1" smtClean="0"/>
+              <a:t>csv</a:t>
+            </a:r>
+            <a:r>
+              <a:rPr lang="en-US" sz="1200" b="1" dirty="0" smtClean="0"/>
+              <a:t>"</a:t>
+            </a:r>
+            <a:r>
+              <a:rPr lang="en-US" sz="1200" dirty="0" smtClean="0"/>
+              <a:t>));</a:t>
+            </a:r>
+            <a:endParaRPr lang="en-US" sz="1200" b="1" dirty="0" smtClean="0"/>
+          </a:p>
+          <a:p>
+            <a:pPr lvl="1"/>
+            <a:r>
+              <a:rPr lang="en-US" sz="1200" b="1" dirty="0" err="1" smtClean="0"/>
+              <a:t>writer</a:t>
+            </a:r>
+            <a:r>
+              <a:rPr lang="en-US" sz="1200" dirty="0" err="1" smtClean="0"/>
+              <a:t>.write</a:t>
+            </a:r>
+            <a:r>
+              <a:rPr lang="en-US" sz="1200" dirty="0" smtClean="0"/>
+              <a:t>(</a:t>
+            </a:r>
+            <a:r>
+              <a:rPr lang="en-US" sz="1200" dirty="0" err="1" smtClean="0"/>
+              <a:t>String.</a:t>
+            </a:r>
+            <a:r>
+              <a:rPr lang="en-US" sz="1200" i="1" dirty="0" err="1" smtClean="0"/>
+              <a:t>format</a:t>
+            </a:r>
+            <a:r>
+              <a:rPr lang="en-US" sz="1200" dirty="0" smtClean="0"/>
+              <a:t>(</a:t>
+            </a:r>
+            <a:r>
+              <a:rPr lang="en-US" sz="1200" b="1" dirty="0" smtClean="0"/>
+              <a:t>"%d; ACC; %f; %f; %f; %f; %f; %f\n"</a:t>
+            </a:r>
+            <a:r>
+              <a:rPr lang="en-US" sz="1200" dirty="0" smtClean="0"/>
+              <a:t>, </a:t>
+            </a:r>
+            <a:r>
+              <a:rPr lang="en-US" sz="1200" dirty="0" err="1" smtClean="0"/>
+              <a:t>evt.</a:t>
+            </a:r>
+            <a:r>
+              <a:rPr lang="en-US" sz="1200" b="1" dirty="0" err="1" smtClean="0"/>
+              <a:t>timestamp</a:t>
+            </a:r>
+            <a:r>
+              <a:rPr lang="en-US" sz="1200" dirty="0" smtClean="0"/>
+              <a:t>, </a:t>
+            </a:r>
+            <a:r>
+              <a:rPr lang="en-US" sz="1200" dirty="0" err="1" smtClean="0"/>
+              <a:t>evt.</a:t>
+            </a:r>
+            <a:r>
+              <a:rPr lang="en-US" sz="1200" b="1" dirty="0" err="1" smtClean="0"/>
+              <a:t>values</a:t>
+            </a:r>
+            <a:r>
+              <a:rPr lang="en-US" sz="1200" dirty="0" smtClean="0"/>
+              <a:t>[0], </a:t>
+            </a:r>
+            <a:r>
+              <a:rPr lang="en-US" sz="1200" dirty="0" err="1" smtClean="0"/>
+              <a:t>evt.</a:t>
+            </a:r>
+            <a:r>
+              <a:rPr lang="en-US" sz="1200" b="1" dirty="0" err="1" smtClean="0"/>
+              <a:t>values</a:t>
+            </a:r>
+            <a:r>
+              <a:rPr lang="en-US" sz="1200" dirty="0" smtClean="0"/>
+              <a:t>[1], </a:t>
+            </a:r>
+            <a:r>
+              <a:rPr lang="en-US" sz="1200" dirty="0" err="1" smtClean="0"/>
+              <a:t>evt.</a:t>
+            </a:r>
+            <a:r>
+              <a:rPr lang="en-US" sz="1200" b="1" dirty="0" err="1" smtClean="0"/>
+              <a:t>values</a:t>
+            </a:r>
+            <a:r>
+              <a:rPr lang="en-US" sz="1200" dirty="0" smtClean="0"/>
+              <a:t>[2], 0.f, 0.f, 0.f));</a:t>
+            </a:r>
+            <a:endParaRPr lang="en-US" sz="1200" dirty="0"/>
+          </a:p>
+        </p:txBody>
+      </p:sp>
     </p:spTree>
   </p:cSld>
   <p:clrMapOvr>
@@ -3745,69 +4069,169 @@
           <a:chExt cx="0" cy="0"/>
         </a:xfrm>
       </p:grpSpPr>
-      <p:pic>
-        <p:nvPicPr>
-          <p:cNvPr id="3074" name="Picture 2"/>
-          <p:cNvPicPr>
-            <a:picLocks noChangeAspect="1" noChangeArrowheads="1"/>
-          </p:cNvPicPr>
-          <p:nvPr/>
-        </p:nvPicPr>
-        <p:blipFill>
-          <a:blip r:embed="rId2" cstate="print"/>
-          <a:srcRect/>
-          <a:stretch>
-            <a:fillRect/>
-          </a:stretch>
-        </p:blipFill>
-        <p:spPr bwMode="auto">
-          <a:xfrm>
-            <a:off x="5524500" y="0"/>
-            <a:ext cx="3619500" cy="6790714"/>
-          </a:xfrm>
-          <a:prstGeom prst="rect">
-            <a:avLst/>
-          </a:prstGeom>
-          <a:noFill/>
-          <a:ln w="9525">
-            <a:noFill/>
-            <a:miter lim="800000"/>
-            <a:headEnd/>
-            <a:tailEnd/>
-          </a:ln>
-        </p:spPr>
-      </p:pic>
-      <p:sp>
-        <p:nvSpPr>
-          <p:cNvPr id="5" name="TextBox 4"/>
-          <p:cNvSpPr txBox="1"/>
-          <p:nvPr/>
-        </p:nvSpPr>
-        <p:spPr>
-          <a:xfrm>
-            <a:off x="838200" y="990600"/>
-            <a:ext cx="2002279" cy="646331"/>
-          </a:xfrm>
-          <a:prstGeom prst="rect">
-            <a:avLst/>
-          </a:prstGeom>
-          <a:noFill/>
-        </p:spPr>
-        <p:txBody>
-          <a:bodyPr wrap="none" rtlCol="0">
-            <a:spAutoFit/>
+      <p:sp>
+        <p:nvSpPr>
+          <p:cNvPr id="2" name="Title 1"/>
+          <p:cNvSpPr>
+            <a:spLocks noGrp="1"/>
+          </p:cNvSpPr>
+          <p:nvPr>
+            <p:ph type="title"/>
+          </p:nvPr>
+        </p:nvSpPr>
+        <p:spPr/>
+        <p:txBody>
+          <a:bodyPr/>
+          <a:lstStyle/>
+          <a:p>
+            <a:r>
+              <a:rPr lang="en-US" dirty="0" smtClean="0"/>
+              <a:t>Adding Navigation Side Bar</a:t>
+            </a:r>
+            <a:endParaRPr lang="en-US" dirty="0"/>
+          </a:p>
+        </p:txBody>
+      </p:sp>
+      <p:sp>
+        <p:nvSpPr>
+          <p:cNvPr id="3" name="Content Placeholder 2"/>
+          <p:cNvSpPr>
+            <a:spLocks noGrp="1"/>
+          </p:cNvSpPr>
+          <p:nvPr>
+            <p:ph idx="1"/>
+          </p:nvPr>
+        </p:nvSpPr>
+        <p:spPr/>
+        <p:txBody>
+          <a:bodyPr>
+            <a:normAutofit fontScale="85000" lnSpcReduction="20000"/>
           </a:bodyPr>
           <a:lstStyle/>
           <a:p>
             <a:r>
               <a:rPr lang="en-US" dirty="0" smtClean="0"/>
-              <a:t>Plotting Data using </a:t>
-            </a:r>
-          </a:p>
-          <a:p>
+              <a:t>Activity XML File</a:t>
+            </a:r>
+          </a:p>
+          <a:p>
+            <a:pPr lvl="1"/>
+            <a:r>
+              <a:rPr lang="en-US" dirty="0" smtClean="0"/>
+              <a:t>Drawer Layout:  Set Unique ID</a:t>
+            </a:r>
+          </a:p>
+          <a:p>
+            <a:pPr lvl="1"/>
+            <a:endParaRPr lang="en-US" dirty="0" smtClean="0"/>
+          </a:p>
+          <a:p>
+            <a:pPr lvl="1"/>
+            <a:r>
+              <a:rPr lang="en-US" dirty="0" smtClean="0"/>
+              <a:t>Includes </a:t>
+            </a:r>
             <a:r>
               <a:rPr lang="en-US" dirty="0" err="1" smtClean="0"/>
-              <a:t>androidplot</a:t>
+              <a:t>app_bar_XXX</a:t>
+            </a:r>
+            <a:r>
+              <a:rPr lang="en-US" dirty="0" smtClean="0"/>
+              <a:t> layout</a:t>
+            </a:r>
+          </a:p>
+          <a:p>
+            <a:pPr lvl="2"/>
+            <a:r>
+              <a:rPr lang="en-US" dirty="0" smtClean="0"/>
+              <a:t>Includes widgets:  </a:t>
+            </a:r>
+            <a:r>
+              <a:rPr lang="en-US" dirty="0" err="1" smtClean="0"/>
+              <a:t>AppBarLayout</a:t>
+            </a:r>
+            <a:r>
+              <a:rPr lang="en-US" dirty="0" smtClean="0"/>
+              <a:t>, </a:t>
+            </a:r>
+            <a:r>
+              <a:rPr lang="en-US" dirty="0" err="1" smtClean="0"/>
+              <a:t>ToolBar</a:t>
+            </a:r>
+            <a:endParaRPr lang="en-US" dirty="0" smtClean="0"/>
+          </a:p>
+          <a:p>
+            <a:pPr lvl="2"/>
+            <a:r>
+              <a:rPr lang="en-US" dirty="0" smtClean="0"/>
+              <a:t>Set </a:t>
+            </a:r>
+            <a:r>
+              <a:rPr lang="en-US" dirty="0" err="1" smtClean="0"/>
+              <a:t>uniqueID</a:t>
+            </a:r>
+            <a:r>
+              <a:rPr lang="en-US" dirty="0" smtClean="0"/>
+              <a:t> to Toolbar</a:t>
+            </a:r>
+          </a:p>
+          <a:p>
+            <a:pPr lvl="2"/>
+            <a:r>
+              <a:rPr lang="en-US" dirty="0" smtClean="0"/>
+              <a:t>Set popup- theme </a:t>
+            </a:r>
+          </a:p>
+          <a:p>
+            <a:pPr lvl="1"/>
+            <a:endParaRPr lang="en-US" dirty="0" smtClean="0"/>
+          </a:p>
+          <a:p>
+            <a:pPr lvl="1"/>
+            <a:r>
+              <a:rPr lang="en-US" dirty="0" smtClean="0"/>
+              <a:t>Navigation View</a:t>
+            </a:r>
+          </a:p>
+          <a:p>
+            <a:pPr lvl="2"/>
+            <a:r>
+              <a:rPr lang="en-US" dirty="0" err="1" smtClean="0"/>
+              <a:t>Nav_Header_Main</a:t>
+            </a:r>
+            <a:r>
+              <a:rPr lang="en-US" dirty="0" smtClean="0"/>
+              <a:t> configures sizes (Need to set ID)</a:t>
+            </a:r>
+          </a:p>
+          <a:p>
+            <a:pPr lvl="2"/>
+            <a:r>
+              <a:rPr lang="en-US" dirty="0" smtClean="0"/>
+              <a:t>Identifies Drawer (need to set buttons)</a:t>
+            </a:r>
+          </a:p>
+          <a:p>
+            <a:pPr lvl="1"/>
+            <a:endParaRPr lang="en-US" dirty="0" smtClean="0"/>
+          </a:p>
+          <a:p>
+            <a:pPr lvl="1"/>
+            <a:r>
+              <a:rPr lang="en-US" dirty="0" err="1" smtClean="0"/>
+              <a:t>OnCreateOptionsMenu</a:t>
+            </a:r>
+            <a:r>
+              <a:rPr lang="en-US" dirty="0" smtClean="0"/>
+              <a:t>(Menu </a:t>
+            </a:r>
+            <a:r>
+              <a:rPr lang="en-US" dirty="0" err="1" smtClean="0"/>
+              <a:t>menu</a:t>
+            </a:r>
+            <a:r>
+              <a:rPr lang="en-US" dirty="0" smtClean="0"/>
+              <a:t>)</a:t>
             </a:r>
             <a:endParaRPr lang="en-US" dirty="0"/>
           </a:p>

</xml_diff>

<commit_message>
Working on SQLite DB
Updating SQL db structure
</commit_message>
<xml_diff>
--- a/AppDevelopment.pptx
+++ b/AppDevelopment.pptx
@@ -9,10 +9,9 @@
     <p:sldId id="261" r:id="rId3"/>
     <p:sldId id="263" r:id="rId4"/>
     <p:sldId id="264" r:id="rId5"/>
-    <p:sldId id="265" r:id="rId6"/>
+    <p:sldId id="269" r:id="rId6"/>
     <p:sldId id="266" r:id="rId7"/>
-    <p:sldId id="267" r:id="rId8"/>
-    <p:sldId id="268" r:id="rId9"/>
+    <p:sldId id="268" r:id="rId8"/>
   </p:sldIdLst>
   <p:sldSz cx="9144000" cy="6858000" type="screen4x3"/>
   <p:notesSz cx="6858000" cy="9144000"/>
@@ -296,7 +295,7 @@
             <a:fld id="{5509802D-546D-4A43-A558-4F6655088C4A}" type="datetimeFigureOut">
               <a:rPr lang="en-US" smtClean="0"/>
               <a:pPr/>
-              <a:t>8/21/2018</a:t>
+              <a:t>8/27/2018</a:t>
             </a:fld>
             <a:endParaRPr lang="en-US"/>
           </a:p>
@@ -463,7 +462,7 @@
             <a:fld id="{5509802D-546D-4A43-A558-4F6655088C4A}" type="datetimeFigureOut">
               <a:rPr lang="en-US" smtClean="0"/>
               <a:pPr/>
-              <a:t>8/21/2018</a:t>
+              <a:t>8/27/2018</a:t>
             </a:fld>
             <a:endParaRPr lang="en-US"/>
           </a:p>
@@ -640,7 +639,7 @@
             <a:fld id="{5509802D-546D-4A43-A558-4F6655088C4A}" type="datetimeFigureOut">
               <a:rPr lang="en-US" smtClean="0"/>
               <a:pPr/>
-              <a:t>8/21/2018</a:t>
+              <a:t>8/27/2018</a:t>
             </a:fld>
             <a:endParaRPr lang="en-US"/>
           </a:p>
@@ -807,7 +806,7 @@
             <a:fld id="{5509802D-546D-4A43-A558-4F6655088C4A}" type="datetimeFigureOut">
               <a:rPr lang="en-US" smtClean="0"/>
               <a:pPr/>
-              <a:t>8/21/2018</a:t>
+              <a:t>8/27/2018</a:t>
             </a:fld>
             <a:endParaRPr lang="en-US"/>
           </a:p>
@@ -1050,7 +1049,7 @@
             <a:fld id="{5509802D-546D-4A43-A558-4F6655088C4A}" type="datetimeFigureOut">
               <a:rPr lang="en-US" smtClean="0"/>
               <a:pPr/>
-              <a:t>8/21/2018</a:t>
+              <a:t>8/27/2018</a:t>
             </a:fld>
             <a:endParaRPr lang="en-US"/>
           </a:p>
@@ -1335,7 +1334,7 @@
             <a:fld id="{5509802D-546D-4A43-A558-4F6655088C4A}" type="datetimeFigureOut">
               <a:rPr lang="en-US" smtClean="0"/>
               <a:pPr/>
-              <a:t>8/21/2018</a:t>
+              <a:t>8/27/2018</a:t>
             </a:fld>
             <a:endParaRPr lang="en-US"/>
           </a:p>
@@ -1754,7 +1753,7 @@
             <a:fld id="{5509802D-546D-4A43-A558-4F6655088C4A}" type="datetimeFigureOut">
               <a:rPr lang="en-US" smtClean="0"/>
               <a:pPr/>
-              <a:t>8/21/2018</a:t>
+              <a:t>8/27/2018</a:t>
             </a:fld>
             <a:endParaRPr lang="en-US"/>
           </a:p>
@@ -1869,7 +1868,7 @@
             <a:fld id="{5509802D-546D-4A43-A558-4F6655088C4A}" type="datetimeFigureOut">
               <a:rPr lang="en-US" smtClean="0"/>
               <a:pPr/>
-              <a:t>8/21/2018</a:t>
+              <a:t>8/27/2018</a:t>
             </a:fld>
             <a:endParaRPr lang="en-US"/>
           </a:p>
@@ -1961,7 +1960,7 @@
             <a:fld id="{5509802D-546D-4A43-A558-4F6655088C4A}" type="datetimeFigureOut">
               <a:rPr lang="en-US" smtClean="0"/>
               <a:pPr/>
-              <a:t>8/21/2018</a:t>
+              <a:t>8/27/2018</a:t>
             </a:fld>
             <a:endParaRPr lang="en-US"/>
           </a:p>
@@ -2235,7 +2234,7 @@
             <a:fld id="{5509802D-546D-4A43-A558-4F6655088C4A}" type="datetimeFigureOut">
               <a:rPr lang="en-US" smtClean="0"/>
               <a:pPr/>
-              <a:t>8/21/2018</a:t>
+              <a:t>8/27/2018</a:t>
             </a:fld>
             <a:endParaRPr lang="en-US"/>
           </a:p>
@@ -2485,7 +2484,7 @@
             <a:fld id="{5509802D-546D-4A43-A558-4F6655088C4A}" type="datetimeFigureOut">
               <a:rPr lang="en-US" smtClean="0"/>
               <a:pPr/>
-              <a:t>8/21/2018</a:t>
+              <a:t>8/27/2018</a:t>
             </a:fld>
             <a:endParaRPr lang="en-US"/>
           </a:p>
@@ -2695,7 +2694,7 @@
             <a:fld id="{5509802D-546D-4A43-A558-4F6655088C4A}" type="datetimeFigureOut">
               <a:rPr lang="en-US" smtClean="0"/>
               <a:pPr/>
-              <a:t>8/21/2018</a:t>
+              <a:t>8/27/2018</a:t>
             </a:fld>
             <a:endParaRPr lang="en-US"/>
           </a:p>
@@ -3903,6 +3902,29 @@
       </p:grpSpPr>
       <p:sp>
         <p:nvSpPr>
+          <p:cNvPr id="2" name="Title 1"/>
+          <p:cNvSpPr>
+            <a:spLocks noGrp="1"/>
+          </p:cNvSpPr>
+          <p:nvPr>
+            <p:ph type="title"/>
+          </p:nvPr>
+        </p:nvSpPr>
+        <p:spPr/>
+        <p:txBody>
+          <a:bodyPr/>
+          <a:lstStyle/>
+          <a:p>
+            <a:r>
+              <a:rPr lang="en-US" dirty="0" smtClean="0"/>
+              <a:t>8.27.2018</a:t>
+            </a:r>
+            <a:endParaRPr lang="en-US" dirty="0"/>
+          </a:p>
+        </p:txBody>
+      </p:sp>
+      <p:sp>
+        <p:nvSpPr>
           <p:cNvPr id="3" name="Content Placeholder 2"/>
           <p:cNvSpPr>
             <a:spLocks noGrp="1"/>
@@ -3911,305 +3933,114 @@
             <p:ph idx="1"/>
           </p:nvPr>
         </p:nvSpPr>
-        <p:spPr>
-          <a:xfrm>
-            <a:off x="457200" y="304800"/>
-            <a:ext cx="8229600" cy="5821363"/>
-          </a:xfrm>
-        </p:spPr>
+        <p:spPr/>
         <p:txBody>
           <a:bodyPr>
-            <a:noAutofit/>
+            <a:normAutofit fontScale="70000" lnSpcReduction="20000"/>
           </a:bodyPr>
           <a:lstStyle/>
           <a:p>
-            <a:pPr fontAlgn="base"/>
-            <a:r>
-              <a:rPr lang="en-US" sz="1100" dirty="0" err="1" smtClean="0"/>
-              <a:t>com.example</a:t>
-            </a:r>
-            <a:endParaRPr lang="en-US" sz="1100" dirty="0" smtClean="0"/>
-          </a:p>
-          <a:p>
-            <a:pPr lvl="1" fontAlgn="base"/>
-            <a:r>
-              <a:rPr lang="en-US" sz="1000" b="1" dirty="0" smtClean="0"/>
-              <a:t>activities</a:t>
-            </a:r>
-            <a:endParaRPr lang="en-US" sz="1000" dirty="0" smtClean="0"/>
-          </a:p>
-          <a:p>
-            <a:pPr lvl="1" fontAlgn="base"/>
-            <a:r>
-              <a:rPr lang="en-US" sz="1000" dirty="0" smtClean="0"/>
-              <a:t>Contains all the activities. Classes are all named with Activity at the end. That way, you can immediately know what it is when reading Java code that doesn't have its full package name.</a:t>
-            </a:r>
-          </a:p>
-          <a:p>
-            <a:pPr lvl="1" fontAlgn="base"/>
-            <a:r>
-              <a:rPr lang="en-US" sz="1000" b="1" dirty="0" smtClean="0"/>
-              <a:t>adapters</a:t>
-            </a:r>
-            <a:endParaRPr lang="en-US" sz="1000" dirty="0" smtClean="0"/>
-          </a:p>
-          <a:p>
-            <a:pPr fontAlgn="base"/>
-            <a:r>
-              <a:rPr lang="en-US" sz="1100" dirty="0" smtClean="0"/>
-              <a:t>Contains all the adapters.</a:t>
-            </a:r>
-          </a:p>
-          <a:p>
-            <a:pPr lvl="1" fontAlgn="base"/>
-            <a:r>
-              <a:rPr lang="en-US" sz="1000" b="1" dirty="0" smtClean="0"/>
-              <a:t>authenticator</a:t>
-            </a:r>
-            <a:endParaRPr lang="en-US" sz="1000" dirty="0" smtClean="0"/>
-          </a:p>
-          <a:p>
-            <a:pPr fontAlgn="base"/>
-            <a:r>
-              <a:rPr lang="en-US" sz="1100" dirty="0" smtClean="0"/>
-              <a:t>Contains any class related to signing a user in. I create a local account and having all related classes together is very handy.</a:t>
-            </a:r>
-          </a:p>
-          <a:p>
-            <a:pPr lvl="1" fontAlgn="base"/>
-            <a:r>
-              <a:rPr lang="en-US" sz="1000" b="1" dirty="0" smtClean="0"/>
-              <a:t>data</a:t>
-            </a:r>
-            <a:endParaRPr lang="en-US" sz="1000" dirty="0" smtClean="0"/>
-          </a:p>
-          <a:p>
-            <a:pPr fontAlgn="base"/>
-            <a:r>
-              <a:rPr lang="en-US" sz="1100" dirty="0" smtClean="0"/>
-              <a:t>Contains all classes related to data management such as </a:t>
-            </a:r>
-            <a:r>
-              <a:rPr lang="en-US" sz="1100" dirty="0" err="1" smtClean="0"/>
-              <a:t>ContentProvider</a:t>
-            </a:r>
-            <a:r>
-              <a:rPr lang="en-US" sz="1100" dirty="0" smtClean="0"/>
-              <a:t> and </a:t>
-            </a:r>
-            <a:r>
-              <a:rPr lang="en-US" sz="1100" dirty="0" err="1" smtClean="0"/>
-              <a:t>SQLiteHelper</a:t>
-            </a:r>
-            <a:r>
-              <a:rPr lang="en-US" sz="1100" dirty="0" smtClean="0"/>
-              <a:t>.</a:t>
-            </a:r>
-          </a:p>
-          <a:p>
-            <a:pPr lvl="1" fontAlgn="base"/>
-            <a:r>
-              <a:rPr lang="en-US" sz="1000" b="1" dirty="0" err="1" smtClean="0"/>
-              <a:t>data.migrations</a:t>
-            </a:r>
-            <a:endParaRPr lang="en-US" sz="1000" dirty="0" smtClean="0"/>
-          </a:p>
-          <a:p>
-            <a:pPr fontAlgn="base"/>
-            <a:r>
-              <a:rPr lang="en-US" sz="1100" dirty="0" smtClean="0"/>
-              <a:t>Contains all of my </a:t>
-            </a:r>
-            <a:r>
-              <a:rPr lang="en-US" sz="1100" dirty="0" err="1" smtClean="0"/>
-              <a:t>SQLite</a:t>
-            </a:r>
-            <a:r>
-              <a:rPr lang="en-US" sz="1100" dirty="0" smtClean="0"/>
-              <a:t> migrations.</a:t>
-            </a:r>
-          </a:p>
-          <a:p>
-            <a:pPr lvl="1" fontAlgn="base"/>
-            <a:r>
-              <a:rPr lang="en-US" sz="1000" b="1" dirty="0" smtClean="0"/>
-              <a:t>fragments</a:t>
-            </a:r>
-            <a:endParaRPr lang="en-US" sz="1000" dirty="0" smtClean="0"/>
-          </a:p>
-          <a:p>
-            <a:pPr fontAlgn="base"/>
-            <a:r>
-              <a:rPr lang="en-US" sz="1100" dirty="0" smtClean="0"/>
-              <a:t>Contains all fragments.</a:t>
-            </a:r>
-          </a:p>
-          <a:p>
-            <a:pPr lvl="1" fontAlgn="base"/>
-            <a:r>
-              <a:rPr lang="en-US" sz="1000" b="1" dirty="0" smtClean="0"/>
-              <a:t>helpers</a:t>
-            </a:r>
-            <a:endParaRPr lang="en-US" sz="1000" dirty="0" smtClean="0"/>
-          </a:p>
-          <a:p>
-            <a:pPr fontAlgn="base"/>
-            <a:r>
-              <a:rPr lang="en-US" sz="1100" dirty="0" smtClean="0"/>
-              <a:t>Contains helper classes. A helper class is a place to put code that is used in more than one place. I have a </a:t>
-            </a:r>
-            <a:r>
-              <a:rPr lang="en-US" sz="1100" dirty="0" err="1" smtClean="0"/>
-              <a:t>DateHelper</a:t>
-            </a:r>
-            <a:r>
-              <a:rPr lang="en-US" sz="1100" dirty="0" smtClean="0"/>
-              <a:t> for instance. Most of the methods are static.</a:t>
-            </a:r>
-          </a:p>
-          <a:p>
-            <a:pPr lvl="1" fontAlgn="base"/>
-            <a:r>
-              <a:rPr lang="en-US" sz="1000" b="1" dirty="0" smtClean="0"/>
-              <a:t>interfaces</a:t>
-            </a:r>
-            <a:endParaRPr lang="en-US" sz="1000" dirty="0" smtClean="0"/>
-          </a:p>
-          <a:p>
-            <a:pPr fontAlgn="base"/>
-            <a:r>
-              <a:rPr lang="en-US" sz="1100" dirty="0" smtClean="0"/>
-              <a:t>Contains all interfaces.</a:t>
-            </a:r>
-          </a:p>
-          <a:p>
-            <a:pPr lvl="1" fontAlgn="base"/>
-            <a:r>
-              <a:rPr lang="en-US" sz="1000" b="1" dirty="0" smtClean="0"/>
-              <a:t>models</a:t>
-            </a:r>
-            <a:endParaRPr lang="en-US" sz="1000" dirty="0" smtClean="0"/>
-          </a:p>
-          <a:p>
-            <a:pPr fontAlgn="base"/>
-            <a:r>
-              <a:rPr lang="en-US" sz="1100" dirty="0" smtClean="0"/>
-              <a:t>Contains all local models. When syncing from an HTTP API I parse the JSON into these Java objects using Jackson. I also pull Cursor rows into these models as well.</a:t>
-            </a:r>
-          </a:p>
-          <a:p>
-            <a:pPr lvl="1" fontAlgn="base"/>
-            <a:r>
-              <a:rPr lang="en-US" sz="1000" b="1" dirty="0" smtClean="0"/>
-              <a:t>preferences</a:t>
-            </a:r>
-            <a:endParaRPr lang="en-US" sz="1000" dirty="0" smtClean="0"/>
-          </a:p>
-          <a:p>
-            <a:pPr fontAlgn="base"/>
-            <a:r>
-              <a:rPr lang="en-US" sz="1100" dirty="0" smtClean="0"/>
-              <a:t>Contains all classes for custom preferences. When creating the preferences I required a custom </a:t>
-            </a:r>
-            <a:r>
-              <a:rPr lang="en-US" sz="1100" dirty="0" err="1" smtClean="0"/>
-              <a:t>PreferenceDialog</a:t>
-            </a:r>
-            <a:r>
-              <a:rPr lang="en-US" sz="1100" dirty="0" smtClean="0"/>
-              <a:t> as well as a custom </a:t>
-            </a:r>
-            <a:r>
-              <a:rPr lang="en-US" sz="1100" dirty="0" err="1" smtClean="0"/>
-              <a:t>PreferenceCategory</a:t>
-            </a:r>
-            <a:r>
-              <a:rPr lang="en-US" sz="1100" dirty="0" smtClean="0"/>
-              <a:t>. They live here.</a:t>
-            </a:r>
-          </a:p>
-          <a:p>
-            <a:pPr lvl="1" fontAlgn="base"/>
-            <a:r>
-              <a:rPr lang="en-US" sz="1000" b="1" dirty="0" smtClean="0"/>
-              <a:t>sync</a:t>
-            </a:r>
-            <a:endParaRPr lang="en-US" sz="1000" dirty="0" smtClean="0"/>
-          </a:p>
-          <a:p>
-            <a:pPr fontAlgn="base"/>
-            <a:r>
-              <a:rPr lang="en-US" sz="1100" dirty="0" smtClean="0"/>
-              <a:t>Contains all classes related to syncing. I use a </a:t>
-            </a:r>
-            <a:r>
-              <a:rPr lang="en-US" sz="1100" dirty="0" err="1" smtClean="0"/>
-              <a:t>SyncAdapter</a:t>
-            </a:r>
-            <a:r>
-              <a:rPr lang="en-US" sz="1100" dirty="0" smtClean="0"/>
-              <a:t> to pull data from an HTTP API. In addition to the </a:t>
-            </a:r>
-            <a:r>
-              <a:rPr lang="en-US" sz="1100" dirty="0" err="1" smtClean="0"/>
-              <a:t>SyncAdapter</a:t>
-            </a:r>
-            <a:r>
-              <a:rPr lang="en-US" sz="1100" dirty="0" smtClean="0"/>
-              <a:t> a </a:t>
-            </a:r>
-            <a:r>
-              <a:rPr lang="en-US" sz="1100" dirty="0" err="1" smtClean="0"/>
-              <a:t>SyncService</a:t>
-            </a:r>
-            <a:r>
-              <a:rPr lang="en-US" sz="1100" dirty="0" smtClean="0"/>
-              <a:t> is required, so I created a package.</a:t>
-            </a:r>
-          </a:p>
-          <a:p>
-            <a:pPr fontAlgn="base"/>
-            <a:r>
-              <a:rPr lang="en-US" sz="1100" b="1" dirty="0" smtClean="0"/>
-              <a:t>Layouts :</a:t>
-            </a:r>
-            <a:endParaRPr lang="en-US" sz="1100" dirty="0" smtClean="0"/>
-          </a:p>
-          <a:p>
-            <a:pPr lvl="1" fontAlgn="base"/>
-            <a:r>
-              <a:rPr lang="en-US" sz="1000" dirty="0" smtClean="0"/>
-              <a:t>Activity Layout name start with </a:t>
-            </a:r>
-            <a:r>
-              <a:rPr lang="en-US" sz="1000" b="1" dirty="0" smtClean="0"/>
-              <a:t>activity_</a:t>
-            </a:r>
-            <a:endParaRPr lang="en-US" sz="1000" dirty="0" smtClean="0"/>
-          </a:p>
-          <a:p>
-            <a:pPr lvl="1" fontAlgn="base"/>
-            <a:r>
-              <a:rPr lang="en-US" sz="1000" dirty="0" smtClean="0"/>
-              <a:t>Adapter Layout row name start with </a:t>
-            </a:r>
-            <a:r>
-              <a:rPr lang="en-US" sz="1000" b="1" dirty="0" smtClean="0"/>
-              <a:t>row_</a:t>
-            </a:r>
-            <a:endParaRPr lang="en-US" sz="1000" dirty="0" smtClean="0"/>
-          </a:p>
-          <a:p>
-            <a:pPr lvl="1" fontAlgn="base"/>
-            <a:r>
-              <a:rPr lang="en-US" sz="1000" dirty="0" smtClean="0"/>
-              <a:t>Fragment Layout name start with </a:t>
-            </a:r>
-            <a:r>
-              <a:rPr lang="en-US" sz="1000" b="1" dirty="0" smtClean="0"/>
-              <a:t>fragment_</a:t>
-            </a:r>
-            <a:endParaRPr lang="en-US" sz="1000" dirty="0" smtClean="0"/>
+            <a:r>
+              <a:rPr lang="en-US" dirty="0" smtClean="0"/>
+              <a:t>Assemble a SQL data-frame of various input data</a:t>
+            </a:r>
+          </a:p>
+          <a:p>
+            <a:pPr lvl="1"/>
+            <a:r>
+              <a:rPr lang="en-US" dirty="0" smtClean="0"/>
+              <a:t>Introduction</a:t>
+            </a:r>
+          </a:p>
+          <a:p>
+            <a:pPr lvl="1"/>
+            <a:r>
+              <a:rPr lang="en-US" dirty="0" smtClean="0"/>
+              <a:t>Experimental</a:t>
+            </a:r>
+          </a:p>
+          <a:p>
+            <a:pPr lvl="1"/>
+            <a:r>
+              <a:rPr lang="en-US" dirty="0" smtClean="0"/>
+              <a:t>Actual Data</a:t>
+            </a:r>
+          </a:p>
+          <a:p>
+            <a:r>
+              <a:rPr lang="en-US" dirty="0" smtClean="0"/>
+              <a:t>Navigates to New Study Activity</a:t>
+            </a:r>
+          </a:p>
+          <a:p>
+            <a:pPr lvl="1"/>
+            <a:r>
+              <a:rPr lang="en-US" dirty="0" smtClean="0"/>
+              <a:t>Instantiates a filename / database in local working directory</a:t>
+            </a:r>
+          </a:p>
+          <a:p>
+            <a:pPr lvl="1"/>
+            <a:r>
+              <a:rPr lang="en-US" dirty="0" smtClean="0"/>
+              <a:t>Appends database with data</a:t>
+            </a:r>
+          </a:p>
+          <a:p>
+            <a:pPr lvl="2"/>
+            <a:r>
+              <a:rPr lang="en-US" dirty="0" smtClean="0"/>
+              <a:t>Introduction , Exp, Data, Observations, Camera, etc…</a:t>
+            </a:r>
+          </a:p>
+          <a:p>
+            <a:pPr lvl="1"/>
+            <a:r>
+              <a:rPr lang="en-US" dirty="0" smtClean="0"/>
+              <a:t>Saves </a:t>
+            </a:r>
+            <a:r>
+              <a:rPr lang="en-US" dirty="0" err="1" smtClean="0"/>
+              <a:t>SQl</a:t>
+            </a:r>
+            <a:r>
+              <a:rPr lang="en-US" dirty="0" smtClean="0"/>
+              <a:t> database as a study</a:t>
+            </a:r>
+          </a:p>
+          <a:p>
+            <a:pPr lvl="1"/>
+            <a:endParaRPr lang="en-US" dirty="0" smtClean="0"/>
+          </a:p>
+          <a:p>
+            <a:r>
+              <a:rPr lang="en-US" dirty="0" smtClean="0"/>
+              <a:t>Build a report of sensor data / entries</a:t>
+            </a:r>
+          </a:p>
+          <a:p>
+            <a:endParaRPr lang="en-US" dirty="0" smtClean="0"/>
+          </a:p>
+          <a:p>
+            <a:r>
+              <a:rPr lang="en-US" dirty="0" smtClean="0"/>
+              <a:t>Email sensor dataset</a:t>
+            </a:r>
+          </a:p>
+          <a:p>
+            <a:endParaRPr lang="en-US" dirty="0" smtClean="0"/>
+          </a:p>
+          <a:p>
+            <a:endParaRPr lang="en-US" dirty="0" smtClean="0"/>
+          </a:p>
+          <a:p>
+            <a:endParaRPr lang="en-US" dirty="0" smtClean="0"/>
+          </a:p>
+          <a:p>
+            <a:endParaRPr lang="en-US" dirty="0" smtClean="0"/>
+          </a:p>
+          <a:p>
+            <a:endParaRPr lang="en-US" dirty="0"/>
           </a:p>
         </p:txBody>
       </p:sp>
@@ -4396,126 +4227,6 @@
           <a:bodyPr/>
           <a:lstStyle/>
           <a:p>
-            <a:endParaRPr lang="en-US"/>
-          </a:p>
-        </p:txBody>
-      </p:sp>
-      <p:sp>
-        <p:nvSpPr>
-          <p:cNvPr id="3" name="Text Placeholder 2"/>
-          <p:cNvSpPr>
-            <a:spLocks noGrp="1"/>
-          </p:cNvSpPr>
-          <p:nvPr>
-            <p:ph type="body" idx="1"/>
-          </p:nvPr>
-        </p:nvSpPr>
-        <p:spPr/>
-        <p:txBody>
-          <a:bodyPr/>
-          <a:lstStyle/>
-          <a:p>
-            <a:endParaRPr lang="en-US"/>
-          </a:p>
-        </p:txBody>
-      </p:sp>
-      <p:sp>
-        <p:nvSpPr>
-          <p:cNvPr id="4" name="Content Placeholder 3"/>
-          <p:cNvSpPr>
-            <a:spLocks noGrp="1"/>
-          </p:cNvSpPr>
-          <p:nvPr>
-            <p:ph sz="half" idx="2"/>
-          </p:nvPr>
-        </p:nvSpPr>
-        <p:spPr/>
-        <p:txBody>
-          <a:bodyPr/>
-          <a:lstStyle/>
-          <a:p>
-            <a:endParaRPr lang="en-US"/>
-          </a:p>
-        </p:txBody>
-      </p:sp>
-      <p:sp>
-        <p:nvSpPr>
-          <p:cNvPr id="5" name="Text Placeholder 4"/>
-          <p:cNvSpPr>
-            <a:spLocks noGrp="1"/>
-          </p:cNvSpPr>
-          <p:nvPr>
-            <p:ph type="body" sz="quarter" idx="3"/>
-          </p:nvPr>
-        </p:nvSpPr>
-        <p:spPr/>
-        <p:txBody>
-          <a:bodyPr/>
-          <a:lstStyle/>
-          <a:p>
-            <a:endParaRPr lang="en-US"/>
-          </a:p>
-        </p:txBody>
-      </p:sp>
-      <p:sp>
-        <p:nvSpPr>
-          <p:cNvPr id="6" name="Content Placeholder 5"/>
-          <p:cNvSpPr>
-            <a:spLocks noGrp="1"/>
-          </p:cNvSpPr>
-          <p:nvPr>
-            <p:ph sz="quarter" idx="4"/>
-          </p:nvPr>
-        </p:nvSpPr>
-        <p:spPr/>
-        <p:txBody>
-          <a:bodyPr/>
-          <a:lstStyle/>
-          <a:p>
-            <a:endParaRPr lang="en-US"/>
-          </a:p>
-        </p:txBody>
-      </p:sp>
-    </p:spTree>
-  </p:cSld>
-  <p:clrMapOvr>
-    <a:masterClrMapping/>
-  </p:clrMapOvr>
-</p:sld>
-</file>
-
-<file path=ppt/slides/slide8.xml><?xml version="1.0" encoding="utf-8"?>
-<p:sld xmlns:a="http://schemas.openxmlformats.org/drawingml/2006/main" xmlns:r="http://schemas.openxmlformats.org/officeDocument/2006/relationships" xmlns:p="http://schemas.openxmlformats.org/presentationml/2006/main">
-  <p:cSld>
-    <p:spTree>
-      <p:nvGrpSpPr>
-        <p:cNvPr id="1" name=""/>
-        <p:cNvGrpSpPr/>
-        <p:nvPr/>
-      </p:nvGrpSpPr>
-      <p:grpSpPr>
-        <a:xfrm>
-          <a:off x="0" y="0"/>
-          <a:ext cx="0" cy="0"/>
-          <a:chOff x="0" y="0"/>
-          <a:chExt cx="0" cy="0"/>
-        </a:xfrm>
-      </p:grpSpPr>
-      <p:sp>
-        <p:nvSpPr>
-          <p:cNvPr id="2" name="Title 1"/>
-          <p:cNvSpPr>
-            <a:spLocks noGrp="1"/>
-          </p:cNvSpPr>
-          <p:nvPr>
-            <p:ph type="title"/>
-          </p:nvPr>
-        </p:nvSpPr>
-        <p:spPr/>
-        <p:txBody>
-          <a:bodyPr/>
-          <a:lstStyle/>
-          <a:p>
             <a:endParaRPr lang="en-US" dirty="0"/>
           </a:p>
         </p:txBody>
@@ -4541,13 +4252,8 @@
             </a:r>
             <a:r>
               <a:rPr lang="en-US" dirty="0" smtClean="0"/>
-              <a:t> </a:t>
-            </a:r>
-            <a:r>
-              <a:rPr lang="en-US" dirty="0" smtClean="0"/>
-              <a:t>Data</a:t>
-            </a:r>
-            <a:endParaRPr lang="en-US" dirty="0" smtClean="0"/>
+              <a:t> Data</a:t>
+            </a:r>
           </a:p>
         </p:txBody>
       </p:sp>
@@ -4738,7 +4444,6 @@
               <a:rPr lang="en-US" sz="1400" dirty="0" smtClean="0"/>
               <a:t>) </a:t>
             </a:r>
-            <a:endParaRPr lang="en-US" sz="1400" dirty="0" smtClean="0"/>
           </a:p>
           <a:p>
             <a:r>
@@ -4763,7 +4468,6 @@
               <a:rPr lang="en-US" sz="1400" dirty="0" smtClean="0"/>
               <a:t>); </a:t>
             </a:r>
-            <a:endParaRPr lang="en-US" sz="1400" dirty="0" smtClean="0"/>
           </a:p>
           <a:p>
             <a:r>
@@ -4786,7 +4490,6 @@
               <a:rPr lang="en-US" sz="1400" dirty="0" smtClean="0"/>
               <a:t>(); </a:t>
             </a:r>
-            <a:endParaRPr lang="en-US" sz="1400" dirty="0" smtClean="0"/>
           </a:p>
           <a:p>
             <a:r>
@@ -4795,13 +4498,8 @@
             </a:r>
             <a:r>
               <a:rPr lang="en-US" sz="1400" dirty="0" smtClean="0"/>
-              <a:t> </a:t>
-            </a:r>
-            <a:r>
-              <a:rPr lang="en-US" sz="1400" dirty="0" smtClean="0"/>
-              <a:t>(bundle != null) </a:t>
-            </a:r>
-            <a:endParaRPr lang="en-US" sz="1400" dirty="0" smtClean="0"/>
+              <a:t> (bundle != null) </a:t>
+            </a:r>
           </a:p>
           <a:p>
             <a:pPr lvl="1"/>
@@ -4825,7 +4523,6 @@
               <a:rPr lang="en-US" sz="1200" dirty="0" smtClean="0"/>
               <a:t>("link")); } </a:t>
             </a:r>
-            <a:endParaRPr lang="en-US" sz="1200" dirty="0" smtClean="0"/>
           </a:p>
           <a:p>
             <a:endParaRPr lang="en-US" sz="1400" dirty="0" smtClean="0"/>

</xml_diff>